<commit_message>
Update 6. Page Rank_Markov Chains.pptx
</commit_message>
<xml_diff>
--- a/6. Page Rank_Markov Chains.pptx
+++ b/6. Page Rank_Markov Chains.pptx
@@ -238,7 +238,7 @@
           <a:p>
             <a:fld id="{1B6E2612-5213-4B6B-99A8-BAC5DC9C4481}" type="datetimeFigureOut">
               <a:rPr lang="en-US" smtClean="0"/>
-              <a:t>12/1/2020</a:t>
+              <a:t>12/2/2020</a:t>
             </a:fld>
             <a:endParaRPr lang="en-US"/>
           </a:p>
@@ -2679,7 +2679,7 @@
           <a:p>
             <a:fld id="{D454A11C-5A77-4A08-B879-6DBBFDBBDAFE}" type="datetime1">
               <a:rPr lang="en-US" smtClean="0"/>
-              <a:t>12/1/2020</a:t>
+              <a:t>12/2/2020</a:t>
             </a:fld>
             <a:endParaRPr lang="en-US"/>
           </a:p>
@@ -2968,7 +2968,7 @@
           <a:p>
             <a:fld id="{AC73922D-9081-40A6-8FBE-63670167AD98}" type="datetime1">
               <a:rPr lang="en-US" smtClean="0"/>
-              <a:t>12/1/2020</a:t>
+              <a:t>12/2/2020</a:t>
             </a:fld>
             <a:endParaRPr lang="en-US"/>
           </a:p>
@@ -3257,7 +3257,7 @@
           <a:p>
             <a:fld id="{EC26F5A0-C9D2-4F77-B347-D66BED85257B}" type="datetime1">
               <a:rPr lang="en-US" smtClean="0"/>
-              <a:t>12/1/2020</a:t>
+              <a:t>12/2/2020</a:t>
             </a:fld>
             <a:endParaRPr lang="en-US"/>
           </a:p>
@@ -3546,7 +3546,7 @@
           <a:p>
             <a:fld id="{2B6F2430-900B-4222-905F-EED32BFA1589}" type="datetime1">
               <a:rPr lang="en-US" smtClean="0"/>
-              <a:t>12/1/2020</a:t>
+              <a:t>12/2/2020</a:t>
             </a:fld>
             <a:endParaRPr lang="en-US"/>
           </a:p>
@@ -3783,7 +3783,7 @@
           <a:p>
             <a:fld id="{2CD130E0-640E-4C5D-8D16-DE7F41FBD753}" type="datetime1">
               <a:rPr lang="en-US" smtClean="0"/>
-              <a:t>12/1/2020</a:t>
+              <a:t>12/2/2020</a:t>
             </a:fld>
             <a:endParaRPr lang="en-US"/>
           </a:p>
@@ -4240,7 +4240,7 @@
           <a:p>
             <a:fld id="{627B7EA4-B0EA-4318-A076-3B69835E495A}" type="datetime1">
               <a:rPr lang="en-US" smtClean="0"/>
-              <a:t>12/1/2020</a:t>
+              <a:t>12/2/2020</a:t>
             </a:fld>
             <a:endParaRPr lang="en-US"/>
           </a:p>
@@ -4431,7 +4431,7 @@
           <a:p>
             <a:fld id="{7ED4FE29-361C-4DC2-A7C6-B5E089DF3A91}" type="datetime1">
               <a:rPr lang="en-US" smtClean="0"/>
-              <a:t>12/1/2020</a:t>
+              <a:t>12/2/2020</a:t>
             </a:fld>
             <a:endParaRPr lang="en-US"/>
           </a:p>
@@ -6804,7 +6804,7 @@
           <a:p>
             <a:fld id="{862788D6-C652-4921-A5E0-02F81E20745E}" type="datetime1">
               <a:rPr lang="en-US" smtClean="0"/>
-              <a:t>12/1/2020</a:t>
+              <a:t>12/2/2020</a:t>
             </a:fld>
             <a:endParaRPr lang="en-US"/>
           </a:p>
@@ -7054,7 +7054,7 @@
           <a:p>
             <a:fld id="{489C13DB-7338-4DF2-835C-1A17F38879EE}" type="datetime1">
               <a:rPr lang="en-US" smtClean="0"/>
-              <a:t>12/1/2020</a:t>
+              <a:t>12/2/2020</a:t>
             </a:fld>
             <a:endParaRPr lang="en-US"/>
           </a:p>
@@ -7440,7 +7440,7 @@
           <a:p>
             <a:fld id="{1182EF5F-566B-49EC-B494-C7B2A0F6EE3D}" type="datetime1">
               <a:rPr lang="en-US" smtClean="0"/>
-              <a:t>12/1/2020</a:t>
+              <a:t>12/2/2020</a:t>
             </a:fld>
             <a:endParaRPr lang="en-US"/>
           </a:p>
@@ -7700,7 +7700,7 @@
           <a:p>
             <a:fld id="{4F02E37B-40D6-4AF0-9DE8-D954394DFF71}" type="datetime1">
               <a:rPr lang="en-US" smtClean="0"/>
-              <a:t>12/1/2020</a:t>
+              <a:t>12/2/2020</a:t>
             </a:fld>
             <a:endParaRPr lang="en-US"/>
           </a:p>
@@ -20839,8 +20839,8 @@
           </a:fontRef>
         </p:style>
       </p:cxnSp>
-      <mc:AlternateContent xmlns:mc="http://schemas.openxmlformats.org/markup-compatibility/2006">
-        <mc:Choice xmlns:a14="http://schemas.microsoft.com/office/drawing/2010/main" Requires="a14">
+      <mc:AlternateContent xmlns:mc="http://schemas.openxmlformats.org/markup-compatibility/2006" xmlns:a14="http://schemas.microsoft.com/office/drawing/2010/main">
+        <mc:Choice Requires="a14">
           <p:sp>
             <p:nvSpPr>
               <p:cNvPr id="4110" name="TextBox 4109">
@@ -21082,7 +21082,13 @@
                                   <a:rPr lang="en-US" b="0" i="1" smtClean="0">
                                     <a:latin typeface="Cambria Math" panose="02040503050406030204" pitchFamily="18" charset="0"/>
                                   </a:rPr>
-                                  <m:t>0.5</m:t>
+                                  <m:t>0</m:t>
+                                </m:r>
+                                <m:r>
+                                  <a:rPr lang="en-US" b="0" i="1" smtClean="0">
+                                    <a:latin typeface="Cambria Math" panose="02040503050406030204" pitchFamily="18" charset="0"/>
+                                  </a:rPr>
+                                  <m:t>.5</m:t>
                                 </m:r>
                               </m:e>
                             </m:mr>
@@ -21136,7 +21142,7 @@
             </p:txBody>
           </p:sp>
         </mc:Choice>
-        <mc:Fallback>
+        <mc:Fallback xmlns="">
           <p:sp>
             <p:nvSpPr>
               <p:cNvPr id="4110" name="TextBox 4109">
@@ -21745,8 +21751,8 @@
           </a:p>
         </p:txBody>
       </p:sp>
-      <mc:AlternateContent xmlns:mc="http://schemas.openxmlformats.org/markup-compatibility/2006">
-        <mc:Choice xmlns:a14="http://schemas.microsoft.com/office/drawing/2010/main" Requires="a14">
+      <mc:AlternateContent xmlns:mc="http://schemas.openxmlformats.org/markup-compatibility/2006" xmlns:a14="http://schemas.microsoft.com/office/drawing/2010/main">
+        <mc:Choice Requires="a14">
           <p:sp>
             <p:nvSpPr>
               <p:cNvPr id="113" name="TextBox 112">
@@ -21835,7 +21841,13 @@
                                 <a:rPr lang="en-US" b="0" i="1" smtClean="0">
                                   <a:latin typeface="Cambria Math" panose="02040503050406030204" pitchFamily="18" charset="0"/>
                                 </a:rPr>
-                                <m:t>0.25</m:t>
+                                <m:t>0</m:t>
+                              </m:r>
+                              <m:r>
+                                <a:rPr lang="en-US" b="0" i="1" smtClean="0">
+                                  <a:latin typeface="Cambria Math" panose="02040503050406030204" pitchFamily="18" charset="0"/>
+                                </a:rPr>
+                                <m:t>.25</m:t>
                               </m:r>
                             </m:e>
                           </m:mr>
@@ -21888,7 +21900,7 @@
             </p:txBody>
           </p:sp>
         </mc:Choice>
-        <mc:Fallback>
+        <mc:Fallback xmlns="">
           <p:sp>
             <p:nvSpPr>
               <p:cNvPr id="113" name="TextBox 112">
@@ -21933,8 +21945,8 @@
           </p:sp>
         </mc:Fallback>
       </mc:AlternateContent>
-      <mc:AlternateContent xmlns:mc="http://schemas.openxmlformats.org/markup-compatibility/2006">
-        <mc:Choice xmlns:a14="http://schemas.microsoft.com/office/drawing/2010/main" Requires="a14">
+      <mc:AlternateContent xmlns:mc="http://schemas.openxmlformats.org/markup-compatibility/2006" xmlns:a14="http://schemas.microsoft.com/office/drawing/2010/main">
+        <mc:Choice Requires="a14">
           <p:sp>
             <p:nvSpPr>
               <p:cNvPr id="118" name="TextBox 117">
@@ -22023,7 +22035,13 @@
                                 <a:rPr lang="en-US" b="0" i="1" smtClean="0">
                                   <a:latin typeface="Cambria Math" panose="02040503050406030204" pitchFamily="18" charset="0"/>
                                 </a:rPr>
-                                <m:t>0∗0.25+0∗0.25+0.5∗0.5+0.5∗0.5</m:t>
+                                <m:t>0</m:t>
+                              </m:r>
+                              <m:r>
+                                <a:rPr lang="en-US" b="0" i="1" smtClean="0">
+                                  <a:latin typeface="Cambria Math" panose="02040503050406030204" pitchFamily="18" charset="0"/>
+                                </a:rPr>
+                                <m:t>∗0.25+0∗0.25+0.5∗0.5+0.5∗0.5</m:t>
                               </m:r>
                             </m:e>
                           </m:mr>
@@ -22076,7 +22094,7 @@
             </p:txBody>
           </p:sp>
         </mc:Choice>
-        <mc:Fallback>
+        <mc:Fallback xmlns="">
           <p:sp>
             <p:nvSpPr>
               <p:cNvPr id="118" name="TextBox 117">
@@ -22121,8 +22139,8 @@
           </p:sp>
         </mc:Fallback>
       </mc:AlternateContent>
-      <mc:AlternateContent xmlns:mc="http://schemas.openxmlformats.org/markup-compatibility/2006">
-        <mc:Choice xmlns:a14="http://schemas.microsoft.com/office/drawing/2010/main" Requires="a14">
+      <mc:AlternateContent xmlns:mc="http://schemas.openxmlformats.org/markup-compatibility/2006" xmlns:a14="http://schemas.microsoft.com/office/drawing/2010/main">
+        <mc:Choice Requires="a14">
           <p:sp>
             <p:nvSpPr>
               <p:cNvPr id="123" name="TextBox 122">
@@ -22211,7 +22229,13 @@
                                 <a:rPr lang="en-US" b="0" i="1" smtClean="0">
                                   <a:latin typeface="Cambria Math" panose="02040503050406030204" pitchFamily="18" charset="0"/>
                                 </a:rPr>
-                                <m:t>0.25</m:t>
+                                <m:t>0</m:t>
+                              </m:r>
+                              <m:r>
+                                <a:rPr lang="en-US" b="0" i="1" smtClean="0">
+                                  <a:latin typeface="Cambria Math" panose="02040503050406030204" pitchFamily="18" charset="0"/>
+                                </a:rPr>
+                                <m:t>.25</m:t>
                               </m:r>
                             </m:e>
                           </m:mr>
@@ -22264,7 +22288,7 @@
             </p:txBody>
           </p:sp>
         </mc:Choice>
-        <mc:Fallback>
+        <mc:Fallback xmlns="">
           <p:sp>
             <p:nvSpPr>
               <p:cNvPr id="123" name="TextBox 122">
@@ -22309,8 +22333,8 @@
           </p:sp>
         </mc:Fallback>
       </mc:AlternateContent>
-      <mc:AlternateContent xmlns:mc="http://schemas.openxmlformats.org/markup-compatibility/2006">
-        <mc:Choice xmlns:a14="http://schemas.microsoft.com/office/drawing/2010/main" Requires="a14">
+      <mc:AlternateContent xmlns:mc="http://schemas.openxmlformats.org/markup-compatibility/2006" xmlns:a14="http://schemas.microsoft.com/office/drawing/2010/main">
+        <mc:Choice Requires="a14">
           <p:sp>
             <p:nvSpPr>
               <p:cNvPr id="4135" name="TextBox 4134">
@@ -22408,7 +22432,7 @@
             </p:txBody>
           </p:sp>
         </mc:Choice>
-        <mc:Fallback>
+        <mc:Fallback xmlns="">
           <p:sp>
             <p:nvSpPr>
               <p:cNvPr id="4135" name="TextBox 4134">
@@ -22500,8 +22524,8 @@
           </a:fontRef>
         </p:style>
       </p:cxnSp>
-      <mc:AlternateContent xmlns:mc="http://schemas.openxmlformats.org/markup-compatibility/2006">
-        <mc:Choice xmlns:a14="http://schemas.microsoft.com/office/drawing/2010/main" Requires="a14">
+      <mc:AlternateContent xmlns:mc="http://schemas.openxmlformats.org/markup-compatibility/2006" xmlns:a14="http://schemas.microsoft.com/office/drawing/2010/main">
+        <mc:Choice Requires="a14">
           <p:sp>
             <p:nvSpPr>
               <p:cNvPr id="132" name="TextBox 131">
@@ -22561,7 +22585,7 @@
             </p:txBody>
           </p:sp>
         </mc:Choice>
-        <mc:Fallback>
+        <mc:Fallback xmlns="">
           <p:sp>
             <p:nvSpPr>
               <p:cNvPr id="132" name="TextBox 131">
@@ -22800,8 +22824,8 @@
           </a:p>
         </p:txBody>
       </p:sp>
-      <mc:AlternateContent xmlns:mc="http://schemas.openxmlformats.org/markup-compatibility/2006">
-        <mc:Choice xmlns:a14="http://schemas.microsoft.com/office/drawing/2010/main" Requires="a14">
+      <mc:AlternateContent xmlns:mc="http://schemas.openxmlformats.org/markup-compatibility/2006" xmlns:a14="http://schemas.microsoft.com/office/drawing/2010/main">
+        <mc:Choice Requires="a14">
           <p:sp>
             <p:nvSpPr>
               <p:cNvPr id="141" name="TextBox 140">
@@ -22933,7 +22957,13 @@
                                 <a:rPr lang="en-US" b="0" i="1" smtClean="0">
                                   <a:latin typeface="Cambria Math" panose="02040503050406030204" pitchFamily="18" charset="0"/>
                                 </a:rPr>
-                                <m:t>0.185</m:t>
+                                <m:t>0</m:t>
+                              </m:r>
+                              <m:r>
+                                <a:rPr lang="en-US" b="0" i="1" smtClean="0">
+                                  <a:latin typeface="Cambria Math" panose="02040503050406030204" pitchFamily="18" charset="0"/>
+                                </a:rPr>
+                                <m:t>.185</m:t>
                               </m:r>
                             </m:e>
                           </m:mr>
@@ -22986,7 +23016,7 @@
             </p:txBody>
           </p:sp>
         </mc:Choice>
-        <mc:Fallback>
+        <mc:Fallback xmlns="">
           <p:sp>
             <p:nvSpPr>
               <p:cNvPr id="141" name="TextBox 140">
@@ -23031,8 +23061,8 @@
           </p:sp>
         </mc:Fallback>
       </mc:AlternateContent>
-      <mc:AlternateContent xmlns:mc="http://schemas.openxmlformats.org/markup-compatibility/2006">
-        <mc:Choice xmlns:a14="http://schemas.microsoft.com/office/drawing/2010/main" Requires="a14">
+      <mc:AlternateContent xmlns:mc="http://schemas.openxmlformats.org/markup-compatibility/2006" xmlns:a14="http://schemas.microsoft.com/office/drawing/2010/main">
+        <mc:Choice Requires="a14">
           <p:sp>
             <p:nvSpPr>
               <p:cNvPr id="142" name="TextBox 141">
@@ -23257,7 +23287,13 @@
                                   <a:rPr lang="en-US" b="0" i="1" smtClean="0">
                                     <a:latin typeface="Cambria Math" panose="02040503050406030204" pitchFamily="18" charset="0"/>
                                   </a:rPr>
-                                  <m:t>0.217</m:t>
+                                  <m:t>0</m:t>
+                                </m:r>
+                                <m:r>
+                                  <a:rPr lang="en-US" b="0" i="1" smtClean="0">
+                                    <a:latin typeface="Cambria Math" panose="02040503050406030204" pitchFamily="18" charset="0"/>
+                                  </a:rPr>
+                                  <m:t>.217</m:t>
                                 </m:r>
                               </m:e>
                             </m:mr>
@@ -23311,7 +23347,7 @@
             </p:txBody>
           </p:sp>
         </mc:Choice>
-        <mc:Fallback>
+        <mc:Fallback xmlns="">
           <p:sp>
             <p:nvSpPr>
               <p:cNvPr id="142" name="TextBox 141">
@@ -23356,8 +23392,8 @@
           </p:sp>
         </mc:Fallback>
       </mc:AlternateContent>
-      <mc:AlternateContent xmlns:mc="http://schemas.openxmlformats.org/markup-compatibility/2006">
-        <mc:Choice xmlns:a14="http://schemas.microsoft.com/office/drawing/2010/main" Requires="a14">
+      <mc:AlternateContent xmlns:mc="http://schemas.openxmlformats.org/markup-compatibility/2006" xmlns:a14="http://schemas.microsoft.com/office/drawing/2010/main">
+        <mc:Choice Requires="a14">
           <p:sp>
             <p:nvSpPr>
               <p:cNvPr id="4152" name="TextBox 4151">
@@ -23417,7 +23453,7 @@
             </p:txBody>
           </p:sp>
         </mc:Choice>
-        <mc:Fallback>
+        <mc:Fallback xmlns="">
           <p:sp>
             <p:nvSpPr>
               <p:cNvPr id="4152" name="TextBox 4151">
@@ -24655,8 +24691,8 @@
           <a:chExt cx="0" cy="0"/>
         </a:xfrm>
       </p:grpSpPr>
-      <mc:AlternateContent xmlns:mc="http://schemas.openxmlformats.org/markup-compatibility/2006">
-        <mc:Choice xmlns:a14="http://schemas.microsoft.com/office/drawing/2010/main" Requires="a14">
+      <mc:AlternateContent xmlns:mc="http://schemas.openxmlformats.org/markup-compatibility/2006" xmlns:a14="http://schemas.microsoft.com/office/drawing/2010/main">
+        <mc:Choice Requires="a14">
           <p:sp>
             <p:nvSpPr>
               <p:cNvPr id="2" name="Text Placeholder 1">
@@ -25020,7 +25056,7 @@
             </p:txBody>
           </p:sp>
         </mc:Choice>
-        <mc:Fallback>
+        <mc:Fallback xmlns="">
           <p:sp>
             <p:nvSpPr>
               <p:cNvPr id="2" name="Text Placeholder 1">
@@ -26998,8 +27034,8 @@
           </a:fontRef>
         </p:style>
       </p:cxnSp>
-      <mc:AlternateContent xmlns:mc="http://schemas.openxmlformats.org/markup-compatibility/2006">
-        <mc:Choice xmlns:a14="http://schemas.microsoft.com/office/drawing/2010/main" Requires="a14">
+      <mc:AlternateContent xmlns:mc="http://schemas.openxmlformats.org/markup-compatibility/2006" xmlns:a14="http://schemas.microsoft.com/office/drawing/2010/main">
+        <mc:Choice Requires="a14">
           <p:sp>
             <p:nvSpPr>
               <p:cNvPr id="110" name="TextBox 109">
@@ -27322,7 +27358,7 @@
             </p:txBody>
           </p:sp>
         </mc:Choice>
-        <mc:Fallback>
+        <mc:Fallback xmlns="">
           <p:sp>
             <p:nvSpPr>
               <p:cNvPr id="110" name="TextBox 109">
@@ -27367,8 +27403,8 @@
           </p:sp>
         </mc:Fallback>
       </mc:AlternateContent>
-      <mc:AlternateContent xmlns:mc="http://schemas.openxmlformats.org/markup-compatibility/2006">
-        <mc:Choice xmlns:a14="http://schemas.microsoft.com/office/drawing/2010/main" Requires="a14">
+      <mc:AlternateContent xmlns:mc="http://schemas.openxmlformats.org/markup-compatibility/2006" xmlns:a14="http://schemas.microsoft.com/office/drawing/2010/main">
+        <mc:Choice Requires="a14">
           <p:sp>
             <p:nvSpPr>
               <p:cNvPr id="39" name="TextBox 38">
@@ -27735,7 +27771,7 @@
             </p:txBody>
           </p:sp>
         </mc:Choice>
-        <mc:Fallback>
+        <mc:Fallback xmlns="">
           <p:sp>
             <p:nvSpPr>
               <p:cNvPr id="39" name="TextBox 38">
@@ -28323,8 +28359,8 @@
           <a:chExt cx="0" cy="0"/>
         </a:xfrm>
       </p:grpSpPr>
-      <mc:AlternateContent xmlns:mc="http://schemas.openxmlformats.org/markup-compatibility/2006">
-        <mc:Choice xmlns:a14="http://schemas.microsoft.com/office/drawing/2010/main" Requires="a14">
+      <mc:AlternateContent xmlns:mc="http://schemas.openxmlformats.org/markup-compatibility/2006" xmlns:a14="http://schemas.microsoft.com/office/drawing/2010/main">
+        <mc:Choice Requires="a14">
           <p:sp>
             <p:nvSpPr>
               <p:cNvPr id="2" name="Text Placeholder 1">
@@ -28371,7 +28407,7 @@
                     <m:r>
                       <a:rPr lang="en-US" sz="2400" i="1" dirty="0" smtClean="0">
                         <a:effectLst/>
-                        <a:latin typeface="+mj-lt"/>
+                        <a:latin typeface="Cambria Math" panose="02040503050406030204" pitchFamily="18" charset="0"/>
                       </a:rPr>
                       <m:t>𝐴</m:t>
                     </m:r>
@@ -28391,7 +28427,7 @@
                         <m:ctrlPr>
                           <a:rPr lang="en-US" sz="2400" i="1">
                             <a:effectLst/>
-                            <a:latin typeface="+mj-lt"/>
+                            <a:latin typeface="Cambria Math" panose="02040503050406030204" pitchFamily="18" charset="0"/>
                           </a:rPr>
                         </m:ctrlPr>
                       </m:fPr>
@@ -28399,7 +28435,7 @@
                         <m:r>
                           <a:rPr lang="en-US" sz="2400">
                             <a:effectLst/>
-                            <a:latin typeface="+mj-lt"/>
+                            <a:latin typeface="Cambria Math" panose="02040503050406030204" pitchFamily="18" charset="0"/>
                           </a:rPr>
                           <m:t>1</m:t>
                         </m:r>
@@ -28408,7 +28444,7 @@
                         <m:r>
                           <a:rPr lang="en-US" sz="2400">
                             <a:effectLst/>
-                            <a:latin typeface="+mj-lt"/>
+                            <a:latin typeface="Cambria Math" panose="02040503050406030204" pitchFamily="18" charset="0"/>
                           </a:rPr>
                           <m:t>𝑁</m:t>
                         </m:r>
@@ -28491,7 +28527,7 @@
                     <m:r>
                       <a:rPr lang="en-US" sz="2400" i="1" dirty="0" smtClean="0">
                         <a:effectLst/>
-                        <a:latin typeface="+mj-lt"/>
+                        <a:latin typeface="Cambria Math" panose="02040503050406030204" pitchFamily="18" charset="0"/>
                       </a:rPr>
                       <m:t>𝐴</m:t>
                     </m:r>
@@ -28544,28 +28580,28 @@
                     <m:r>
                       <a:rPr lang="en-US" sz="2400" b="0" i="0" smtClean="0">
                         <a:effectLst/>
-                        <a:latin typeface="+mj-lt"/>
+                        <a:latin typeface="Cambria Math" panose="02040503050406030204" pitchFamily="18" charset="0"/>
                       </a:rPr>
                       <m:t>(</m:t>
                     </m:r>
                     <m:r>
                       <a:rPr lang="en-US" sz="2400">
                         <a:effectLst/>
-                        <a:latin typeface="+mj-lt"/>
+                        <a:latin typeface="Cambria Math" panose="02040503050406030204" pitchFamily="18" charset="0"/>
                       </a:rPr>
                       <m:t>1−</m:t>
                     </m:r>
                     <m:r>
                       <a:rPr lang="en-US" sz="2400">
                         <a:effectLst/>
-                        <a:latin typeface="+mj-lt"/>
+                        <a:latin typeface="Cambria Math" panose="02040503050406030204" pitchFamily="18" charset="0"/>
                       </a:rPr>
                       <m:t>𝛼</m:t>
                     </m:r>
                     <m:r>
                       <a:rPr lang="en-US" sz="2400" b="0" i="0" smtClean="0">
                         <a:effectLst/>
-                        <a:latin typeface="+mj-lt"/>
+                        <a:latin typeface="Cambria Math" panose="02040503050406030204" pitchFamily="18" charset="0"/>
                       </a:rPr>
                       <m:t>)</m:t>
                     </m:r>
@@ -28624,7 +28660,7 @@
                         <m:ctrlPr>
                           <a:rPr lang="en-US" sz="3200" i="1">
                             <a:effectLst/>
-                            <a:latin typeface="+mj-lt"/>
+                            <a:latin typeface="Cambria Math" panose="02040503050406030204" pitchFamily="18" charset="0"/>
                           </a:rPr>
                         </m:ctrlPr>
                       </m:fPr>
@@ -28632,7 +28668,7 @@
                         <m:r>
                           <a:rPr lang="en-US" sz="3200">
                             <a:effectLst/>
-                            <a:latin typeface="+mj-lt"/>
+                            <a:latin typeface="Cambria Math" panose="02040503050406030204" pitchFamily="18" charset="0"/>
                           </a:rPr>
                           <m:t>𝛼</m:t>
                         </m:r>
@@ -28641,7 +28677,7 @@
                         <m:r>
                           <a:rPr lang="en-US" sz="3200">
                             <a:effectLst/>
-                            <a:latin typeface="+mj-lt"/>
+                            <a:latin typeface="Cambria Math" panose="02040503050406030204" pitchFamily="18" charset="0"/>
                           </a:rPr>
                           <m:t>𝑁</m:t>
                         </m:r>
@@ -28668,7 +28704,7 @@
                     <m:r>
                       <a:rPr lang="en-US" sz="2400" i="1" dirty="0" smtClean="0">
                         <a:effectLst/>
-                        <a:latin typeface="+mj-lt"/>
+                        <a:latin typeface="Cambria Math" panose="02040503050406030204" pitchFamily="18" charset="0"/>
                       </a:rPr>
                       <m:t>𝑀</m:t>
                     </m:r>
@@ -28688,7 +28724,7 @@
             </p:txBody>
           </p:sp>
         </mc:Choice>
-        <mc:Fallback>
+        <mc:Fallback xmlns="">
           <p:sp>
             <p:nvSpPr>
               <p:cNvPr id="2" name="Text Placeholder 1">
@@ -28732,8 +28768,8 @@
           </p:sp>
         </mc:Fallback>
       </mc:AlternateContent>
-      <mc:AlternateContent xmlns:mc="http://schemas.openxmlformats.org/markup-compatibility/2006">
-        <mc:Choice xmlns:a14="http://schemas.microsoft.com/office/drawing/2010/main" Requires="a14">
+      <mc:AlternateContent xmlns:mc="http://schemas.openxmlformats.org/markup-compatibility/2006" xmlns:a14="http://schemas.microsoft.com/office/drawing/2010/main">
+        <mc:Choice Requires="a14">
           <p:sp>
             <p:nvSpPr>
               <p:cNvPr id="3" name="Title 2">
@@ -28793,7 +28829,7 @@
             </p:txBody>
           </p:sp>
         </mc:Choice>
-        <mc:Fallback>
+        <mc:Fallback xmlns="">
           <p:sp>
             <p:nvSpPr>
               <p:cNvPr id="3" name="Title 2">
@@ -32635,8 +32671,8 @@
           </a:fontRef>
         </p:style>
       </p:cxnSp>
-      <mc:AlternateContent xmlns:mc="http://schemas.openxmlformats.org/markup-compatibility/2006">
-        <mc:Choice xmlns:a14="http://schemas.microsoft.com/office/drawing/2010/main" Requires="a14">
+      <mc:AlternateContent xmlns:mc="http://schemas.openxmlformats.org/markup-compatibility/2006" xmlns:a14="http://schemas.microsoft.com/office/drawing/2010/main">
+        <mc:Choice Requires="a14">
           <p:sp>
             <p:nvSpPr>
               <p:cNvPr id="108" name="TextBox 107">
@@ -32857,13 +32893,7 @@
                         <a:rPr lang="en-US" b="0" i="1" smtClean="0">
                           <a:latin typeface="Cambria Math" panose="02040503050406030204" pitchFamily="18" charset="0"/>
                         </a:rPr>
-                        <m:t>𝑃</m:t>
-                      </m:r>
-                      <m:r>
-                        <a:rPr lang="en-US" b="0" i="1" smtClean="0">
-                          <a:latin typeface="Cambria Math" panose="02040503050406030204" pitchFamily="18" charset="0"/>
-                        </a:rPr>
-                        <m:t>𝑟</m:t>
+                        <m:t>𝑃𝑟</m:t>
                       </m:r>
                       <m:d>
                         <m:dPr>
@@ -32932,7 +32962,7 @@
             </p:txBody>
           </p:sp>
         </mc:Choice>
-        <mc:Fallback>
+        <mc:Fallback xmlns="">
           <p:sp>
             <p:nvSpPr>
               <p:cNvPr id="108" name="TextBox 107">
@@ -32977,8 +33007,8 @@
           </p:sp>
         </mc:Fallback>
       </mc:AlternateContent>
-      <mc:AlternateContent xmlns:mc="http://schemas.openxmlformats.org/markup-compatibility/2006">
-        <mc:Choice xmlns:a14="http://schemas.microsoft.com/office/drawing/2010/main" Requires="a14">
+      <mc:AlternateContent xmlns:mc="http://schemas.openxmlformats.org/markup-compatibility/2006" xmlns:a14="http://schemas.microsoft.com/office/drawing/2010/main">
+        <mc:Choice Requires="a14">
           <p:sp>
             <p:nvSpPr>
               <p:cNvPr id="109" name="TextBox 108">
@@ -33115,7 +33145,7 @@
             </p:txBody>
           </p:sp>
         </mc:Choice>
-        <mc:Fallback>
+        <mc:Fallback xmlns="">
           <p:sp>
             <p:nvSpPr>
               <p:cNvPr id="109" name="TextBox 108">
@@ -33160,8 +33190,8 @@
           </p:sp>
         </mc:Fallback>
       </mc:AlternateContent>
-      <mc:AlternateContent xmlns:mc="http://schemas.openxmlformats.org/markup-compatibility/2006">
-        <mc:Choice xmlns:a14="http://schemas.microsoft.com/office/drawing/2010/main" Requires="a14">
+      <mc:AlternateContent xmlns:mc="http://schemas.openxmlformats.org/markup-compatibility/2006" xmlns:a14="http://schemas.microsoft.com/office/drawing/2010/main">
+        <mc:Choice Requires="a14">
           <p:sp>
             <p:nvSpPr>
               <p:cNvPr id="110" name="TextBox 109">
@@ -33325,13 +33355,7 @@
                         <a:rPr lang="en-US" b="0" i="1" smtClean="0">
                           <a:latin typeface="Cambria Math" panose="02040503050406030204" pitchFamily="18" charset="0"/>
                         </a:rPr>
-                        <m:t>𝑃</m:t>
-                      </m:r>
-                      <m:r>
-                        <a:rPr lang="en-US" b="0" i="1" smtClean="0">
-                          <a:latin typeface="Cambria Math" panose="02040503050406030204" pitchFamily="18" charset="0"/>
-                        </a:rPr>
-                        <m:t>𝑟</m:t>
+                        <m:t>𝑃𝑟</m:t>
                       </m:r>
                       <m:d>
                         <m:dPr>
@@ -33358,7 +33382,7 @@
             </p:txBody>
           </p:sp>
         </mc:Choice>
-        <mc:Fallback>
+        <mc:Fallback xmlns="">
           <p:sp>
             <p:nvSpPr>
               <p:cNvPr id="110" name="TextBox 109">
@@ -33449,8 +33473,8 @@
           </a:p>
         </p:txBody>
       </p:sp>
-      <mc:AlternateContent xmlns:mc="http://schemas.openxmlformats.org/markup-compatibility/2006">
-        <mc:Choice xmlns:a14="http://schemas.microsoft.com/office/drawing/2010/main" Requires="a14">
+      <mc:AlternateContent xmlns:mc="http://schemas.openxmlformats.org/markup-compatibility/2006" xmlns:a14="http://schemas.microsoft.com/office/drawing/2010/main">
+        <mc:Choice Requires="a14">
           <p:sp>
             <p:nvSpPr>
               <p:cNvPr id="115" name="TextBox 114">
@@ -33705,7 +33729,7 @@
             </p:txBody>
           </p:sp>
         </mc:Choice>
-        <mc:Fallback>
+        <mc:Fallback xmlns="">
           <p:sp>
             <p:nvSpPr>
               <p:cNvPr id="115" name="TextBox 114">
@@ -33750,8 +33774,8 @@
           </p:sp>
         </mc:Fallback>
       </mc:AlternateContent>
-      <mc:AlternateContent xmlns:mc="http://schemas.openxmlformats.org/markup-compatibility/2006">
-        <mc:Choice xmlns:a14="http://schemas.microsoft.com/office/drawing/2010/main" Requires="a14">
+      <mc:AlternateContent xmlns:mc="http://schemas.openxmlformats.org/markup-compatibility/2006" xmlns:a14="http://schemas.microsoft.com/office/drawing/2010/main">
+        <mc:Choice Requires="a14">
           <p:sp>
             <p:nvSpPr>
               <p:cNvPr id="114" name="TextBox 113">
@@ -34386,7 +34410,7 @@
             </p:txBody>
           </p:sp>
         </mc:Choice>
-        <mc:Fallback>
+        <mc:Fallback xmlns="">
           <p:sp>
             <p:nvSpPr>
               <p:cNvPr id="114" name="TextBox 113">
@@ -35533,8 +35557,8 @@
           </a:p>
         </p:txBody>
       </p:sp>
-      <mc:AlternateContent xmlns:mc="http://schemas.openxmlformats.org/markup-compatibility/2006">
-        <mc:Choice xmlns:a14="http://schemas.microsoft.com/office/drawing/2010/main" Requires="a14">
+      <mc:AlternateContent xmlns:mc="http://schemas.openxmlformats.org/markup-compatibility/2006" xmlns:a14="http://schemas.microsoft.com/office/drawing/2010/main">
+        <mc:Choice Requires="a14">
           <p:sp>
             <p:nvSpPr>
               <p:cNvPr id="3" name="Content Placeholder 2">
@@ -36017,7 +36041,7 @@
             </p:txBody>
           </p:sp>
         </mc:Choice>
-        <mc:Fallback>
+        <mc:Fallback xmlns="">
           <p:sp>
             <p:nvSpPr>
               <p:cNvPr id="3" name="Content Placeholder 2">
@@ -36090,8 +36114,8 @@
           </a:p>
         </p:txBody>
       </p:sp>
-      <mc:AlternateContent xmlns:mc="http://schemas.openxmlformats.org/markup-compatibility/2006">
-        <mc:Choice xmlns:a14="http://schemas.microsoft.com/office/drawing/2010/main" Requires="a14">
+      <mc:AlternateContent xmlns:mc="http://schemas.openxmlformats.org/markup-compatibility/2006" xmlns:a14="http://schemas.microsoft.com/office/drawing/2010/main">
+        <mc:Choice Requires="a14">
           <p:sp>
             <p:nvSpPr>
               <p:cNvPr id="6" name="TextBox 5">
@@ -36281,7 +36305,7 @@
             </p:txBody>
           </p:sp>
         </mc:Choice>
-        <mc:Fallback>
+        <mc:Fallback xmlns="">
           <p:sp>
             <p:nvSpPr>
               <p:cNvPr id="6" name="TextBox 5">
@@ -39640,8 +39664,8 @@
           </a:fontRef>
         </p:style>
       </p:cxnSp>
-      <mc:AlternateContent xmlns:mc="http://schemas.openxmlformats.org/markup-compatibility/2006">
-        <mc:Choice xmlns:a14="http://schemas.microsoft.com/office/drawing/2010/main" Requires="a14">
+      <mc:AlternateContent xmlns:mc="http://schemas.openxmlformats.org/markup-compatibility/2006" xmlns:a14="http://schemas.microsoft.com/office/drawing/2010/main">
+        <mc:Choice Requires="a14">
           <p:graphicFrame>
             <p:nvGraphicFramePr>
               <p:cNvPr id="132" name="Table 132">
@@ -44190,7 +44214,7 @@
             </a:graphic>
           </p:graphicFrame>
         </mc:Choice>
-        <mc:Fallback>
+        <mc:Fallback xmlns="">
           <p:graphicFrame>
             <p:nvGraphicFramePr>
               <p:cNvPr id="132" name="Table 132">

</xml_diff>